<commit_message>
add references and new graphic slide
</commit_message>
<xml_diff>
--- a/images/safe_cpp_graphics.pptx
+++ b/images/safe_cpp_graphics.pptx
@@ -5,11 +5,12 @@
     <p:sldMasterId id="2147483648" r:id="rId1"/>
   </p:sldMasterIdLst>
   <p:notesMasterIdLst>
-    <p:notesMasterId r:id="rId4"/>
+    <p:notesMasterId r:id="rId5"/>
   </p:notesMasterIdLst>
   <p:sldIdLst>
     <p:sldId id="257" r:id="rId2"/>
     <p:sldId id="258" r:id="rId3"/>
+    <p:sldId id="259" r:id="rId4"/>
   </p:sldIdLst>
   <p:sldSz cx="12192000" cy="6858000"/>
   <p:notesSz cx="6858000" cy="9144000"/>
@@ -108,7 +109,111 @@
       </a:defRPr>
     </a:lvl9pPr>
   </p:defaultTextStyle>
+  <p:extLst>
+    <p:ext uri="{EFAFB233-063F-42B5-8137-9DF3F51BA10A}">
+      <p15:sldGuideLst xmlns:p15="http://schemas.microsoft.com/office/powerpoint/2012/main"/>
+    </p:ext>
+  </p:extLst>
 </p:presentation>
+</file>
+
+<file path=ppt/revisionInfo.xml><?xml version="1.0" encoding="utf-8"?>
+<p1510:revInfo xmlns:a="http://schemas.openxmlformats.org/drawingml/2006/main" xmlns:r="http://schemas.openxmlformats.org/officeDocument/2006/relationships" xmlns:p1510="http://schemas.microsoft.com/office/powerpoint/2015/10/main">
+  <p1510:revLst>
+    <p1510:client id="{6585F13F-33BA-4F17-B27D-9BE1D369637C}" v="4" dt="2024-05-29T23:07:54.796"/>
+  </p1510:revLst>
+</p1510:revInfo>
+</file>
+
+<file path=ppt/changesInfos/changesInfo1.xml><?xml version="1.0" encoding="utf-8"?>
+<pc:chgInfo xmlns:a="http://schemas.openxmlformats.org/drawingml/2006/main" xmlns:r="http://schemas.openxmlformats.org/officeDocument/2006/relationships" xmlns:ac="http://schemas.microsoft.com/office/drawing/2013/main/command" xmlns:pc="http://schemas.microsoft.com/office/powerpoint/2013/main/command">
+  <pc:docChgLst>
+    <pc:chgData name="Chelsey Patton" userId="118e9353-974d-4cb4-841e-78e1123a20b2" providerId="ADAL" clId="{6585F13F-33BA-4F17-B27D-9BE1D369637C}"/>
+    <pc:docChg chg="custSel addSld modSld">
+      <pc:chgData name="Chelsey Patton" userId="118e9353-974d-4cb4-841e-78e1123a20b2" providerId="ADAL" clId="{6585F13F-33BA-4F17-B27D-9BE1D369637C}" dt="2024-05-29T23:14:44.387" v="23" actId="1076"/>
+      <pc:docMkLst>
+        <pc:docMk/>
+      </pc:docMkLst>
+      <pc:sldChg chg="addSp modSp">
+        <pc:chgData name="Chelsey Patton" userId="118e9353-974d-4cb4-841e-78e1123a20b2" providerId="ADAL" clId="{6585F13F-33BA-4F17-B27D-9BE1D369637C}" dt="2024-05-29T23:07:00.712" v="0"/>
+        <pc:sldMkLst>
+          <pc:docMk/>
+          <pc:sldMk cId="1362214191" sldId="257"/>
+        </pc:sldMkLst>
+        <pc:picChg chg="add mod">
+          <ac:chgData name="Chelsey Patton" userId="118e9353-974d-4cb4-841e-78e1123a20b2" providerId="ADAL" clId="{6585F13F-33BA-4F17-B27D-9BE1D369637C}" dt="2024-05-29T23:07:00.712" v="0"/>
+          <ac:picMkLst>
+            <pc:docMk/>
+            <pc:sldMk cId="1362214191" sldId="257"/>
+            <ac:picMk id="2" creationId="{4BF53EAC-5122-9406-DE46-3545351DB24D}"/>
+          </ac:picMkLst>
+        </pc:picChg>
+      </pc:sldChg>
+      <pc:sldChg chg="addSp modSp">
+        <pc:chgData name="Chelsey Patton" userId="118e9353-974d-4cb4-841e-78e1123a20b2" providerId="ADAL" clId="{6585F13F-33BA-4F17-B27D-9BE1D369637C}" dt="2024-05-29T23:07:14.724" v="1"/>
+        <pc:sldMkLst>
+          <pc:docMk/>
+          <pc:sldMk cId="3435387853" sldId="258"/>
+        </pc:sldMkLst>
+        <pc:picChg chg="add mod">
+          <ac:chgData name="Chelsey Patton" userId="118e9353-974d-4cb4-841e-78e1123a20b2" providerId="ADAL" clId="{6585F13F-33BA-4F17-B27D-9BE1D369637C}" dt="2024-05-29T23:07:14.724" v="1"/>
+          <ac:picMkLst>
+            <pc:docMk/>
+            <pc:sldMk cId="3435387853" sldId="258"/>
+            <ac:picMk id="2" creationId="{F9AD67CE-8E2C-1BBF-5AF3-E9B1004078B3}"/>
+          </ac:picMkLst>
+        </pc:picChg>
+      </pc:sldChg>
+      <pc:sldChg chg="addSp delSp modSp new mod modClrScheme chgLayout">
+        <pc:chgData name="Chelsey Patton" userId="118e9353-974d-4cb4-841e-78e1123a20b2" providerId="ADAL" clId="{6585F13F-33BA-4F17-B27D-9BE1D369637C}" dt="2024-05-29T23:14:44.387" v="23" actId="1076"/>
+        <pc:sldMkLst>
+          <pc:docMk/>
+          <pc:sldMk cId="237638749" sldId="259"/>
+        </pc:sldMkLst>
+        <pc:spChg chg="del">
+          <ac:chgData name="Chelsey Patton" userId="118e9353-974d-4cb4-841e-78e1123a20b2" providerId="ADAL" clId="{6585F13F-33BA-4F17-B27D-9BE1D369637C}" dt="2024-05-29T23:07:52.529" v="3" actId="700"/>
+          <ac:spMkLst>
+            <pc:docMk/>
+            <pc:sldMk cId="237638749" sldId="259"/>
+            <ac:spMk id="2" creationId="{9D42C37F-902E-09C7-3A01-74E801A764FB}"/>
+          </ac:spMkLst>
+        </pc:spChg>
+        <pc:spChg chg="del">
+          <ac:chgData name="Chelsey Patton" userId="118e9353-974d-4cb4-841e-78e1123a20b2" providerId="ADAL" clId="{6585F13F-33BA-4F17-B27D-9BE1D369637C}" dt="2024-05-29T23:07:52.529" v="3" actId="700"/>
+          <ac:spMkLst>
+            <pc:docMk/>
+            <pc:sldMk cId="237638749" sldId="259"/>
+            <ac:spMk id="3" creationId="{E59AB6AC-0C4A-9C75-8611-484E7E6D75CB}"/>
+          </ac:spMkLst>
+        </pc:spChg>
+        <pc:picChg chg="add mod">
+          <ac:chgData name="Chelsey Patton" userId="118e9353-974d-4cb4-841e-78e1123a20b2" providerId="ADAL" clId="{6585F13F-33BA-4F17-B27D-9BE1D369637C}" dt="2024-05-29T23:14:06.783" v="20" actId="1076"/>
+          <ac:picMkLst>
+            <pc:docMk/>
+            <pc:sldMk cId="237638749" sldId="259"/>
+            <ac:picMk id="4" creationId="{FFAF4CCD-7609-ECF7-0A9C-5A36A1EBA745}"/>
+          </ac:picMkLst>
+        </pc:picChg>
+        <pc:picChg chg="add mod">
+          <ac:chgData name="Chelsey Patton" userId="118e9353-974d-4cb4-841e-78e1123a20b2" providerId="ADAL" clId="{6585F13F-33BA-4F17-B27D-9BE1D369637C}" dt="2024-05-29T23:14:44.387" v="23" actId="1076"/>
+          <ac:picMkLst>
+            <pc:docMk/>
+            <pc:sldMk cId="237638749" sldId="259"/>
+            <ac:picMk id="5" creationId="{3079CCB2-ED34-D3E1-5817-3117DD537230}"/>
+          </ac:picMkLst>
+        </pc:picChg>
+        <pc:picChg chg="add mod">
+          <ac:chgData name="Chelsey Patton" userId="118e9353-974d-4cb4-841e-78e1123a20b2" providerId="ADAL" clId="{6585F13F-33BA-4F17-B27D-9BE1D369637C}" dt="2024-05-29T23:14:39.229" v="22" actId="1076"/>
+          <ac:picMkLst>
+            <pc:docMk/>
+            <pc:sldMk cId="237638749" sldId="259"/>
+            <ac:picMk id="7" creationId="{CA54EEC7-30CC-E216-10C2-FD6A0961577A}"/>
+          </ac:picMkLst>
+        </pc:picChg>
+      </pc:sldChg>
+    </pc:docChg>
+  </pc:docChgLst>
+</pc:chgInfo>
 </file>
 
 <file path=ppt/notesMasters/notesMaster1.xml><?xml version="1.0" encoding="utf-8"?>
@@ -193,7 +298,7 @@
           <a:p>
             <a:fld id="{C68647B1-79CD-4ACB-89D4-20B11AA7876B}" type="datetimeFigureOut">
               <a:rPr lang="en-US" smtClean="0"/>
-              <a:t>4/22/2024</a:t>
+              <a:t>5/29/2024</a:t>
             </a:fld>
             <a:endParaRPr lang="en-US"/>
           </a:p>
@@ -691,7 +796,7 @@
           <a:p>
             <a:fld id="{37FA23ED-991A-47D3-B061-47B53EBD3556}" type="datetimeFigureOut">
               <a:rPr lang="en-US" smtClean="0"/>
-              <a:t>4/22/2024</a:t>
+              <a:t>5/29/2024</a:t>
             </a:fld>
             <a:endParaRPr lang="en-US"/>
           </a:p>
@@ -889,7 +994,7 @@
           <a:p>
             <a:fld id="{37FA23ED-991A-47D3-B061-47B53EBD3556}" type="datetimeFigureOut">
               <a:rPr lang="en-US" smtClean="0"/>
-              <a:t>4/22/2024</a:t>
+              <a:t>5/29/2024</a:t>
             </a:fld>
             <a:endParaRPr lang="en-US"/>
           </a:p>
@@ -1097,7 +1202,7 @@
           <a:p>
             <a:fld id="{37FA23ED-991A-47D3-B061-47B53EBD3556}" type="datetimeFigureOut">
               <a:rPr lang="en-US" smtClean="0"/>
-              <a:t>4/22/2024</a:t>
+              <a:t>5/29/2024</a:t>
             </a:fld>
             <a:endParaRPr lang="en-US"/>
           </a:p>
@@ -1295,7 +1400,7 @@
           <a:p>
             <a:fld id="{37FA23ED-991A-47D3-B061-47B53EBD3556}" type="datetimeFigureOut">
               <a:rPr lang="en-US" smtClean="0"/>
-              <a:t>4/22/2024</a:t>
+              <a:t>5/29/2024</a:t>
             </a:fld>
             <a:endParaRPr lang="en-US"/>
           </a:p>
@@ -1570,7 +1675,7 @@
           <a:p>
             <a:fld id="{37FA23ED-991A-47D3-B061-47B53EBD3556}" type="datetimeFigureOut">
               <a:rPr lang="en-US" smtClean="0"/>
-              <a:t>4/22/2024</a:t>
+              <a:t>5/29/2024</a:t>
             </a:fld>
             <a:endParaRPr lang="en-US"/>
           </a:p>
@@ -1835,7 +1940,7 @@
           <a:p>
             <a:fld id="{37FA23ED-991A-47D3-B061-47B53EBD3556}" type="datetimeFigureOut">
               <a:rPr lang="en-US" smtClean="0"/>
-              <a:t>4/22/2024</a:t>
+              <a:t>5/29/2024</a:t>
             </a:fld>
             <a:endParaRPr lang="en-US"/>
           </a:p>
@@ -2247,7 +2352,7 @@
           <a:p>
             <a:fld id="{37FA23ED-991A-47D3-B061-47B53EBD3556}" type="datetimeFigureOut">
               <a:rPr lang="en-US" smtClean="0"/>
-              <a:t>4/22/2024</a:t>
+              <a:t>5/29/2024</a:t>
             </a:fld>
             <a:endParaRPr lang="en-US"/>
           </a:p>
@@ -2388,7 +2493,7 @@
           <a:p>
             <a:fld id="{37FA23ED-991A-47D3-B061-47B53EBD3556}" type="datetimeFigureOut">
               <a:rPr lang="en-US" smtClean="0"/>
-              <a:t>4/22/2024</a:t>
+              <a:t>5/29/2024</a:t>
             </a:fld>
             <a:endParaRPr lang="en-US"/>
           </a:p>
@@ -2501,7 +2606,7 @@
           <a:p>
             <a:fld id="{37FA23ED-991A-47D3-B061-47B53EBD3556}" type="datetimeFigureOut">
               <a:rPr lang="en-US" smtClean="0"/>
-              <a:t>4/22/2024</a:t>
+              <a:t>5/29/2024</a:t>
             </a:fld>
             <a:endParaRPr lang="en-US"/>
           </a:p>
@@ -2812,7 +2917,7 @@
           <a:p>
             <a:fld id="{37FA23ED-991A-47D3-B061-47B53EBD3556}" type="datetimeFigureOut">
               <a:rPr lang="en-US" smtClean="0"/>
-              <a:t>4/22/2024</a:t>
+              <a:t>5/29/2024</a:t>
             </a:fld>
             <a:endParaRPr lang="en-US"/>
           </a:p>
@@ -3100,7 +3205,7 @@
           <a:p>
             <a:fld id="{37FA23ED-991A-47D3-B061-47B53EBD3556}" type="datetimeFigureOut">
               <a:rPr lang="en-US" smtClean="0"/>
-              <a:t>4/22/2024</a:t>
+              <a:t>5/29/2024</a:t>
             </a:fld>
             <a:endParaRPr lang="en-US"/>
           </a:p>
@@ -3341,7 +3446,7 @@
           <a:p>
             <a:fld id="{37FA23ED-991A-47D3-B061-47B53EBD3556}" type="datetimeFigureOut">
               <a:rPr lang="en-US" smtClean="0"/>
-              <a:t>4/22/2024</a:t>
+              <a:t>5/29/2024</a:t>
             </a:fld>
             <a:endParaRPr lang="en-US"/>
           </a:p>
@@ -4212,6 +4317,36 @@
           </a:p>
         </p:txBody>
       </p:sp>
+      <p:pic>
+        <p:nvPicPr>
+          <p:cNvPr id="2" name="Picture 1">
+            <a:extLst>
+              <a:ext uri="{FF2B5EF4-FFF2-40B4-BE49-F238E27FC236}">
+                <a16:creationId xmlns:a16="http://schemas.microsoft.com/office/drawing/2014/main" id="{4BF53EAC-5122-9406-DE46-3545351DB24D}"/>
+              </a:ext>
+            </a:extLst>
+          </p:cNvPr>
+          <p:cNvPicPr>
+            <a:picLocks noChangeAspect="1"/>
+          </p:cNvPicPr>
+          <p:nvPr/>
+        </p:nvPicPr>
+        <p:blipFill>
+          <a:blip r:embed="rId14"/>
+          <a:stretch>
+            <a:fillRect/>
+          </a:stretch>
+        </p:blipFill>
+        <p:spPr>
+          <a:xfrm>
+            <a:off x="3975652" y="1889442"/>
+            <a:ext cx="6501848" cy="4720907"/>
+          </a:xfrm>
+          <a:prstGeom prst="rect">
+            <a:avLst/>
+          </a:prstGeom>
+        </p:spPr>
+      </p:pic>
     </p:spTree>
     <p:extLst>
       <p:ext uri="{BB962C8B-B14F-4D97-AF65-F5344CB8AC3E}">
@@ -4647,6 +4782,126 @@
     <p:extLst>
       <p:ext uri="{BB962C8B-B14F-4D97-AF65-F5344CB8AC3E}">
         <p14:creationId xmlns:p14="http://schemas.microsoft.com/office/powerpoint/2010/main" val="3435387853"/>
+      </p:ext>
+    </p:extLst>
+  </p:cSld>
+  <p:clrMapOvr>
+    <a:masterClrMapping/>
+  </p:clrMapOvr>
+</p:sld>
+</file>
+
+<file path=ppt/slides/slide3.xml><?xml version="1.0" encoding="utf-8"?>
+<p:sld xmlns:a="http://schemas.openxmlformats.org/drawingml/2006/main" xmlns:r="http://schemas.openxmlformats.org/officeDocument/2006/relationships" xmlns:p="http://schemas.openxmlformats.org/presentationml/2006/main">
+  <p:cSld>
+    <p:spTree>
+      <p:nvGrpSpPr>
+        <p:cNvPr id="1" name=""/>
+        <p:cNvGrpSpPr/>
+        <p:nvPr/>
+      </p:nvGrpSpPr>
+      <p:grpSpPr>
+        <a:xfrm>
+          <a:off x="0" y="0"/>
+          <a:ext cx="0" cy="0"/>
+          <a:chOff x="0" y="0"/>
+          <a:chExt cx="0" cy="0"/>
+        </a:xfrm>
+      </p:grpSpPr>
+      <p:pic>
+        <p:nvPicPr>
+          <p:cNvPr id="4" name="Picture 3">
+            <a:extLst>
+              <a:ext uri="{FF2B5EF4-FFF2-40B4-BE49-F238E27FC236}">
+                <a16:creationId xmlns:a16="http://schemas.microsoft.com/office/drawing/2014/main" id="{FFAF4CCD-7609-ECF7-0A9C-5A36A1EBA745}"/>
+              </a:ext>
+            </a:extLst>
+          </p:cNvPr>
+          <p:cNvPicPr>
+            <a:picLocks noChangeAspect="1"/>
+          </p:cNvPicPr>
+          <p:nvPr/>
+        </p:nvPicPr>
+        <p:blipFill>
+          <a:blip r:embed="rId2"/>
+          <a:stretch>
+            <a:fillRect/>
+          </a:stretch>
+        </p:blipFill>
+        <p:spPr>
+          <a:xfrm>
+            <a:off x="8116215" y="0"/>
+            <a:ext cx="4075785" cy="5258430"/>
+          </a:xfrm>
+          <a:prstGeom prst="rect">
+            <a:avLst/>
+          </a:prstGeom>
+        </p:spPr>
+      </p:pic>
+      <p:pic>
+        <p:nvPicPr>
+          <p:cNvPr id="5" name="Picture 4">
+            <a:extLst>
+              <a:ext uri="{FF2B5EF4-FFF2-40B4-BE49-F238E27FC236}">
+                <a16:creationId xmlns:a16="http://schemas.microsoft.com/office/drawing/2014/main" id="{3079CCB2-ED34-D3E1-5817-3117DD537230}"/>
+              </a:ext>
+            </a:extLst>
+          </p:cNvPr>
+          <p:cNvPicPr>
+            <a:picLocks noChangeAspect="1"/>
+          </p:cNvPicPr>
+          <p:nvPr/>
+        </p:nvPicPr>
+        <p:blipFill>
+          <a:blip r:embed="rId3"/>
+          <a:stretch>
+            <a:fillRect/>
+          </a:stretch>
+        </p:blipFill>
+        <p:spPr>
+          <a:xfrm>
+            <a:off x="0" y="49192"/>
+            <a:ext cx="6501848" cy="4720907"/>
+          </a:xfrm>
+          <a:prstGeom prst="rect">
+            <a:avLst/>
+          </a:prstGeom>
+        </p:spPr>
+      </p:pic>
+      <p:pic>
+        <p:nvPicPr>
+          <p:cNvPr id="7" name="Picture 6">
+            <a:extLst>
+              <a:ext uri="{FF2B5EF4-FFF2-40B4-BE49-F238E27FC236}">
+                <a16:creationId xmlns:a16="http://schemas.microsoft.com/office/drawing/2014/main" id="{CA54EEC7-30CC-E216-10C2-FD6A0961577A}"/>
+              </a:ext>
+            </a:extLst>
+          </p:cNvPr>
+          <p:cNvPicPr>
+            <a:picLocks noChangeAspect="1"/>
+          </p:cNvPicPr>
+          <p:nvPr/>
+        </p:nvPicPr>
+        <p:blipFill>
+          <a:blip r:embed="rId4"/>
+          <a:stretch>
+            <a:fillRect/>
+          </a:stretch>
+        </p:blipFill>
+        <p:spPr>
+          <a:xfrm>
+            <a:off x="3844093" y="2025569"/>
+            <a:ext cx="4272122" cy="5874966"/>
+          </a:xfrm>
+          <a:prstGeom prst="rect">
+            <a:avLst/>
+          </a:prstGeom>
+        </p:spPr>
+      </p:pic>
+    </p:spTree>
+    <p:extLst>
+      <p:ext uri="{BB962C8B-B14F-4D97-AF65-F5344CB8AC3E}">
+        <p14:creationId xmlns:p14="http://schemas.microsoft.com/office/powerpoint/2010/main" val="237638749"/>
       </p:ext>
     </p:extLst>
   </p:cSld>

</xml_diff>